<commit_message>
Transforms for external tilesets
</commit_message>
<xml_diff>
--- a/figures/tileTransform.pptx
+++ b/figures/tileTransform.pptx
@@ -104,6 +104,11 @@
       </a:defRPr>
     </a:lvl9pPr>
   </p:defaultTextStyle>
+  <p:extLst>
+    <p:ext uri="{EFAFB233-063F-42B5-8137-9DF3F51BA10A}">
+      <p15:sldGuideLst xmlns:p15="http://schemas.microsoft.com/office/powerpoint/2012/main"/>
+    </p:ext>
+  </p:extLst>
 </p:presentation>
 </file>
 
@@ -3632,6 +3637,429 @@
           </a:fontRef>
         </p:style>
       </p:cxnSp>
+      <p:sp>
+        <p:nvSpPr>
+          <p:cNvPr id="16" name="Oval 15"/>
+          <p:cNvSpPr/>
+          <p:nvPr/>
+        </p:nvSpPr>
+        <p:spPr>
+          <a:xfrm>
+            <a:off x="6189429" y="224622"/>
+            <a:ext cx="620202" cy="620202"/>
+          </a:xfrm>
+          <a:prstGeom prst="ellipse">
+            <a:avLst/>
+          </a:prstGeom>
+          <a:solidFill>
+            <a:schemeClr val="bg1">
+              <a:lumMod val="85000"/>
+            </a:schemeClr>
+          </a:solidFill>
+          <a:ln w="6350">
+            <a:solidFill>
+              <a:schemeClr val="tx1"/>
+            </a:solidFill>
+          </a:ln>
+        </p:spPr>
+        <p:style>
+          <a:lnRef idx="2">
+            <a:schemeClr val="accent1">
+              <a:shade val="50000"/>
+            </a:schemeClr>
+          </a:lnRef>
+          <a:fillRef idx="1">
+            <a:schemeClr val="accent1"/>
+          </a:fillRef>
+          <a:effectRef idx="0">
+            <a:schemeClr val="accent1"/>
+          </a:effectRef>
+          <a:fontRef idx="minor">
+            <a:schemeClr val="lt1"/>
+          </a:fontRef>
+        </p:style>
+        <p:txBody>
+          <a:bodyPr rtlCol="0" anchor="ctr"/>
+          <a:lstStyle/>
+          <a:p>
+            <a:pPr algn="ctr"/>
+            <a:r>
+              <a:rPr lang="en-US" dirty="0" smtClean="0">
+                <a:solidFill>
+                  <a:schemeClr val="tx1"/>
+                </a:solidFill>
+              </a:rPr>
+              <a:t>T0</a:t>
+            </a:r>
+            <a:endParaRPr lang="en-US" dirty="0">
+              <a:solidFill>
+                <a:schemeClr val="tx1"/>
+              </a:solidFill>
+            </a:endParaRPr>
+          </a:p>
+        </p:txBody>
+      </p:sp>
+      <p:cxnSp>
+        <p:nvCxnSpPr>
+          <p:cNvPr id="27" name="Straight Connector 26"/>
+          <p:cNvCxnSpPr>
+            <a:stCxn id="16" idx="4"/>
+          </p:cNvCxnSpPr>
+          <p:nvPr/>
+        </p:nvCxnSpPr>
+        <p:spPr>
+          <a:xfrm flipH="1">
+            <a:off x="6496216" y="844824"/>
+            <a:ext cx="3314" cy="412143"/>
+          </a:xfrm>
+          <a:prstGeom prst="line">
+            <a:avLst/>
+          </a:prstGeom>
+          <a:ln w="6350">
+            <a:solidFill>
+              <a:schemeClr val="tx1"/>
+            </a:solidFill>
+          </a:ln>
+        </p:spPr>
+        <p:style>
+          <a:lnRef idx="1">
+            <a:schemeClr val="accent1"/>
+          </a:lnRef>
+          <a:fillRef idx="0">
+            <a:schemeClr val="accent1"/>
+          </a:fillRef>
+          <a:effectRef idx="0">
+            <a:schemeClr val="accent1"/>
+          </a:effectRef>
+          <a:fontRef idx="minor">
+            <a:schemeClr val="tx1"/>
+          </a:fontRef>
+        </p:style>
+      </p:cxnSp>
+      <p:sp>
+        <p:nvSpPr>
+          <p:cNvPr id="32" name="Oval 31"/>
+          <p:cNvSpPr/>
+          <p:nvPr/>
+        </p:nvSpPr>
+        <p:spPr>
+          <a:xfrm>
+            <a:off x="6184792" y="1256967"/>
+            <a:ext cx="620202" cy="620202"/>
+          </a:xfrm>
+          <a:prstGeom prst="ellipse">
+            <a:avLst/>
+          </a:prstGeom>
+          <a:solidFill>
+            <a:schemeClr val="bg1">
+              <a:lumMod val="85000"/>
+            </a:schemeClr>
+          </a:solidFill>
+          <a:ln w="6350">
+            <a:solidFill>
+              <a:schemeClr val="tx1"/>
+            </a:solidFill>
+          </a:ln>
+        </p:spPr>
+        <p:style>
+          <a:lnRef idx="2">
+            <a:schemeClr val="accent1">
+              <a:shade val="50000"/>
+            </a:schemeClr>
+          </a:lnRef>
+          <a:fillRef idx="1">
+            <a:schemeClr val="accent1"/>
+          </a:fillRef>
+          <a:effectRef idx="0">
+            <a:schemeClr val="accent1"/>
+          </a:effectRef>
+          <a:fontRef idx="minor">
+            <a:schemeClr val="lt1"/>
+          </a:fontRef>
+        </p:style>
+        <p:txBody>
+          <a:bodyPr rtlCol="0" anchor="ctr"/>
+          <a:lstStyle/>
+          <a:p>
+            <a:pPr algn="ctr"/>
+            <a:r>
+              <a:rPr lang="en-US" dirty="0" smtClean="0">
+                <a:solidFill>
+                  <a:schemeClr val="tx1"/>
+                </a:solidFill>
+              </a:rPr>
+              <a:t>T1</a:t>
+            </a:r>
+            <a:endParaRPr lang="en-US" dirty="0">
+              <a:solidFill>
+                <a:schemeClr val="tx1"/>
+              </a:solidFill>
+            </a:endParaRPr>
+          </a:p>
+        </p:txBody>
+      </p:sp>
+      <p:sp>
+        <p:nvSpPr>
+          <p:cNvPr id="33" name="Rectangle 32"/>
+          <p:cNvSpPr/>
+          <p:nvPr/>
+        </p:nvSpPr>
+        <p:spPr>
+          <a:xfrm>
+            <a:off x="6557840" y="1718143"/>
+            <a:ext cx="956142" cy="318052"/>
+          </a:xfrm>
+          <a:prstGeom prst="rect">
+            <a:avLst/>
+          </a:prstGeom>
+          <a:solidFill>
+            <a:schemeClr val="bg1">
+              <a:lumMod val="85000"/>
+            </a:schemeClr>
+          </a:solidFill>
+          <a:ln w="6350">
+            <a:solidFill>
+              <a:schemeClr val="tx1"/>
+            </a:solidFill>
+          </a:ln>
+        </p:spPr>
+        <p:style>
+          <a:lnRef idx="2">
+            <a:schemeClr val="accent1">
+              <a:shade val="50000"/>
+            </a:schemeClr>
+          </a:lnRef>
+          <a:fillRef idx="1">
+            <a:schemeClr val="accent1"/>
+          </a:fillRef>
+          <a:effectRef idx="0">
+            <a:schemeClr val="accent1"/>
+          </a:effectRef>
+          <a:fontRef idx="minor">
+            <a:schemeClr val="lt1"/>
+          </a:fontRef>
+        </p:style>
+        <p:txBody>
+          <a:bodyPr rtlCol="0" anchor="ctr"/>
+          <a:lstStyle/>
+          <a:p>
+            <a:pPr algn="ctr"/>
+            <a:r>
+              <a:rPr lang="en-US" sz="1000" dirty="0" smtClean="0">
+                <a:solidFill>
+                  <a:schemeClr val="tx1"/>
+                </a:solidFill>
+              </a:rPr>
+              <a:t>References external tileset</a:t>
+            </a:r>
+            <a:endParaRPr lang="en-US" sz="1000" dirty="0">
+              <a:solidFill>
+                <a:schemeClr val="tx1"/>
+              </a:solidFill>
+            </a:endParaRPr>
+          </a:p>
+        </p:txBody>
+      </p:sp>
+      <p:sp>
+        <p:nvSpPr>
+          <p:cNvPr id="35" name="Oval 34"/>
+          <p:cNvSpPr/>
+          <p:nvPr/>
+        </p:nvSpPr>
+        <p:spPr>
+          <a:xfrm>
+            <a:off x="7908232" y="1567068"/>
+            <a:ext cx="620202" cy="620202"/>
+          </a:xfrm>
+          <a:prstGeom prst="ellipse">
+            <a:avLst/>
+          </a:prstGeom>
+          <a:solidFill>
+            <a:schemeClr val="bg1">
+              <a:lumMod val="85000"/>
+            </a:schemeClr>
+          </a:solidFill>
+          <a:ln w="6350">
+            <a:solidFill>
+              <a:schemeClr val="tx1"/>
+            </a:solidFill>
+          </a:ln>
+        </p:spPr>
+        <p:style>
+          <a:lnRef idx="2">
+            <a:schemeClr val="accent1">
+              <a:shade val="50000"/>
+            </a:schemeClr>
+          </a:lnRef>
+          <a:fillRef idx="1">
+            <a:schemeClr val="accent1"/>
+          </a:fillRef>
+          <a:effectRef idx="0">
+            <a:schemeClr val="accent1"/>
+          </a:effectRef>
+          <a:fontRef idx="minor">
+            <a:schemeClr val="lt1"/>
+          </a:fontRef>
+        </p:style>
+        <p:txBody>
+          <a:bodyPr rtlCol="0" anchor="ctr"/>
+          <a:lstStyle/>
+          <a:p>
+            <a:pPr algn="ctr"/>
+            <a:r>
+              <a:rPr lang="en-US" dirty="0" smtClean="0">
+                <a:solidFill>
+                  <a:schemeClr val="tx1"/>
+                </a:solidFill>
+              </a:rPr>
+              <a:t>T2</a:t>
+            </a:r>
+            <a:endParaRPr lang="en-US" dirty="0">
+              <a:solidFill>
+                <a:schemeClr val="tx1"/>
+              </a:solidFill>
+            </a:endParaRPr>
+          </a:p>
+        </p:txBody>
+      </p:sp>
+      <p:cxnSp>
+        <p:nvCxnSpPr>
+          <p:cNvPr id="36" name="Straight Connector 35"/>
+          <p:cNvCxnSpPr>
+            <a:stCxn id="35" idx="4"/>
+          </p:cNvCxnSpPr>
+          <p:nvPr/>
+        </p:nvCxnSpPr>
+        <p:spPr>
+          <a:xfrm flipH="1">
+            <a:off x="8215019" y="2187270"/>
+            <a:ext cx="3314" cy="412143"/>
+          </a:xfrm>
+          <a:prstGeom prst="line">
+            <a:avLst/>
+          </a:prstGeom>
+          <a:ln w="6350">
+            <a:solidFill>
+              <a:schemeClr val="tx1"/>
+            </a:solidFill>
+          </a:ln>
+        </p:spPr>
+        <p:style>
+          <a:lnRef idx="1">
+            <a:schemeClr val="accent1"/>
+          </a:lnRef>
+          <a:fillRef idx="0">
+            <a:schemeClr val="accent1"/>
+          </a:fillRef>
+          <a:effectRef idx="0">
+            <a:schemeClr val="accent1"/>
+          </a:effectRef>
+          <a:fontRef idx="minor">
+            <a:schemeClr val="tx1"/>
+          </a:fontRef>
+        </p:style>
+      </p:cxnSp>
+      <p:sp>
+        <p:nvSpPr>
+          <p:cNvPr id="37" name="Oval 36"/>
+          <p:cNvSpPr/>
+          <p:nvPr/>
+        </p:nvSpPr>
+        <p:spPr>
+          <a:xfrm>
+            <a:off x="7903595" y="2599413"/>
+            <a:ext cx="620202" cy="620202"/>
+          </a:xfrm>
+          <a:prstGeom prst="ellipse">
+            <a:avLst/>
+          </a:prstGeom>
+          <a:solidFill>
+            <a:schemeClr val="bg1">
+              <a:lumMod val="85000"/>
+            </a:schemeClr>
+          </a:solidFill>
+          <a:ln w="6350">
+            <a:solidFill>
+              <a:schemeClr val="tx1"/>
+            </a:solidFill>
+          </a:ln>
+        </p:spPr>
+        <p:style>
+          <a:lnRef idx="2">
+            <a:schemeClr val="accent1">
+              <a:shade val="50000"/>
+            </a:schemeClr>
+          </a:lnRef>
+          <a:fillRef idx="1">
+            <a:schemeClr val="accent1"/>
+          </a:fillRef>
+          <a:effectRef idx="0">
+            <a:schemeClr val="accent1"/>
+          </a:effectRef>
+          <a:fontRef idx="minor">
+            <a:schemeClr val="lt1"/>
+          </a:fontRef>
+        </p:style>
+        <p:txBody>
+          <a:bodyPr rtlCol="0" anchor="ctr"/>
+          <a:lstStyle/>
+          <a:p>
+            <a:pPr algn="ctr"/>
+            <a:r>
+              <a:rPr lang="en-US" dirty="0" smtClean="0">
+                <a:solidFill>
+                  <a:schemeClr val="tx1"/>
+                </a:solidFill>
+              </a:rPr>
+              <a:t>T3</a:t>
+            </a:r>
+            <a:endParaRPr lang="en-US" dirty="0">
+              <a:solidFill>
+                <a:schemeClr val="tx1"/>
+              </a:solidFill>
+            </a:endParaRPr>
+          </a:p>
+        </p:txBody>
+      </p:sp>
+      <p:cxnSp>
+        <p:nvCxnSpPr>
+          <p:cNvPr id="14" name="Straight Arrow Connector 13"/>
+          <p:cNvCxnSpPr>
+            <a:stCxn id="33" idx="3"/>
+            <a:endCxn id="35" idx="2"/>
+          </p:cNvCxnSpPr>
+          <p:nvPr/>
+        </p:nvCxnSpPr>
+        <p:spPr>
+          <a:xfrm>
+            <a:off x="7513982" y="1877169"/>
+            <a:ext cx="394250" cy="0"/>
+          </a:xfrm>
+          <a:prstGeom prst="straightConnector1">
+            <a:avLst/>
+          </a:prstGeom>
+          <a:ln>
+            <a:solidFill>
+              <a:schemeClr val="tx1"/>
+            </a:solidFill>
+            <a:tailEnd type="triangle"/>
+          </a:ln>
+        </p:spPr>
+        <p:style>
+          <a:lnRef idx="1">
+            <a:schemeClr val="accent1"/>
+          </a:lnRef>
+          <a:fillRef idx="0">
+            <a:schemeClr val="accent1"/>
+          </a:fillRef>
+          <a:effectRef idx="0">
+            <a:schemeClr val="accent1"/>
+          </a:effectRef>
+          <a:fontRef idx="minor">
+            <a:schemeClr val="tx1"/>
+          </a:fontRef>
+        </p:style>
+      </p:cxnSp>
     </p:spTree>
     <p:extLst>
       <p:ext uri="{BB962C8B-B14F-4D97-AF65-F5344CB8AC3E}">

</xml_diff>